<commit_message>
ich hoffe es stürzt nicht wieder ab!
</commit_message>
<xml_diff>
--- a/GlobalSeminarUSA/AditionalData/selection.pptx
+++ b/GlobalSeminarUSA/AditionalData/selection.pptx
@@ -981,11 +981,11 @@
             <a:t>Scanner </a:t>
           </a:r>
           <a:r>
-            <a:rPr lang="de-CH" dirty="0" err="1" smtClean="0">
+            <a:rPr lang="de-CH" dirty="0" smtClean="0">
               <a:latin typeface="Times New Roman" pitchFamily="18" charset="0"/>
               <a:cs typeface="Times New Roman" pitchFamily="18" charset="0"/>
             </a:rPr>
-            <a:t>module</a:t>
+            <a:t>Module</a:t>
           </a:r>
           <a:endParaRPr lang="de-CH" dirty="0">
             <a:latin typeface="Times New Roman" pitchFamily="18" charset="0"/>
@@ -1079,18 +1079,11 @@
         <a:lstStyle/>
         <a:p>
           <a:r>
-            <a:rPr lang="de-CH" dirty="0" err="1" smtClean="0">
-              <a:latin typeface="Times New Roman" pitchFamily="18" charset="0"/>
-              <a:cs typeface="Times New Roman" pitchFamily="18" charset="0"/>
-            </a:rPr>
-            <a:t>operating</a:t>
-          </a:r>
-          <a:r>
             <a:rPr lang="de-CH" dirty="0" smtClean="0">
               <a:latin typeface="Times New Roman" pitchFamily="18" charset="0"/>
               <a:cs typeface="Times New Roman" pitchFamily="18" charset="0"/>
             </a:rPr>
-            <a:t> power</a:t>
+            <a:t>Operating Power</a:t>
           </a:r>
           <a:endParaRPr lang="de-CH" dirty="0">
             <a:latin typeface="Times New Roman" pitchFamily="18" charset="0"/>
@@ -1139,7 +1132,7 @@
               <a:latin typeface="Times New Roman" pitchFamily="18" charset="0"/>
               <a:cs typeface="Times New Roman" pitchFamily="18" charset="0"/>
             </a:rPr>
-            <a:t>positioning</a:t>
+            <a:t>Positioning</a:t>
           </a:r>
           <a:endParaRPr lang="de-CH" dirty="0">
             <a:latin typeface="Times New Roman" pitchFamily="18" charset="0"/>
@@ -1188,21 +1181,14 @@
               <a:latin typeface="Times New Roman" pitchFamily="18" charset="0"/>
               <a:cs typeface="Times New Roman" pitchFamily="18" charset="0"/>
             </a:rPr>
-            <a:t>velocity</a:t>
+            <a:t>Velocity</a:t>
           </a:r>
           <a:r>
             <a:rPr lang="de-CH" dirty="0" smtClean="0">
               <a:latin typeface="Times New Roman" pitchFamily="18" charset="0"/>
               <a:cs typeface="Times New Roman" pitchFamily="18" charset="0"/>
             </a:rPr>
-            <a:t> </a:t>
-          </a:r>
-          <a:r>
-            <a:rPr lang="de-CH" dirty="0" err="1" smtClean="0">
-              <a:latin typeface="Times New Roman" pitchFamily="18" charset="0"/>
-              <a:cs typeface="Times New Roman" pitchFamily="18" charset="0"/>
-            </a:rPr>
-            <a:t>measurement</a:t>
+            <a:t> Measurement</a:t>
           </a:r>
           <a:endParaRPr lang="de-CH" dirty="0">
             <a:latin typeface="Times New Roman" pitchFamily="18" charset="0"/>
@@ -1247,11 +1233,11 @@
         <a:lstStyle/>
         <a:p>
           <a:r>
-            <a:rPr lang="de-CH" dirty="0" err="1" smtClean="0">
+            <a:rPr lang="de-CH" dirty="0" smtClean="0">
               <a:latin typeface="Times New Roman" pitchFamily="18" charset="0"/>
               <a:cs typeface="Times New Roman" pitchFamily="18" charset="0"/>
             </a:rPr>
-            <a:t>storage</a:t>
+            <a:t>Storage</a:t>
           </a:r>
           <a:endParaRPr lang="de-CH" dirty="0">
             <a:latin typeface="Times New Roman" pitchFamily="18" charset="0"/>
@@ -1296,13 +1282,13 @@
         <a:lstStyle/>
         <a:p>
           <a:r>
-            <a:rPr lang="de-CH" smtClean="0">
+            <a:rPr lang="de-CH" dirty="0" smtClean="0">
               <a:latin typeface="Times New Roman" pitchFamily="18" charset="0"/>
               <a:cs typeface="Times New Roman" pitchFamily="18" charset="0"/>
             </a:rPr>
-            <a:t>transport</a:t>
+            <a:t>Transport</a:t>
           </a:r>
-          <a:endParaRPr lang="de-CH">
+          <a:endParaRPr lang="de-CH" dirty="0">
             <a:latin typeface="Times New Roman" pitchFamily="18" charset="0"/>
             <a:cs typeface="Times New Roman" pitchFamily="18" charset="0"/>
           </a:endParaRPr>
@@ -1334,6 +1320,99 @@
             <a:latin typeface="Times New Roman" pitchFamily="18" charset="0"/>
             <a:cs typeface="Times New Roman" pitchFamily="18" charset="0"/>
           </a:endParaRPr>
+        </a:p>
+      </dgm:t>
+    </dgm:pt>
+    <dgm:pt modelId="{AE33D4D4-1E84-4A41-85C9-B50BF719633E}">
+      <dgm:prSet/>
+      <dgm:spPr/>
+      <dgm:t>
+        <a:bodyPr/>
+        <a:lstStyle/>
+        <a:p>
+          <a:r>
+            <a:rPr lang="de-CH" dirty="0" smtClean="0">
+              <a:latin typeface="Times New Roman" pitchFamily="18" charset="0"/>
+              <a:cs typeface="Times New Roman" pitchFamily="18" charset="0"/>
+            </a:rPr>
+            <a:t>Image Hole </a:t>
+          </a:r>
+          <a:r>
+            <a:rPr lang="de-CH" dirty="0" err="1" smtClean="0">
+              <a:latin typeface="Times New Roman" pitchFamily="18" charset="0"/>
+              <a:cs typeface="Times New Roman" pitchFamily="18" charset="0"/>
+            </a:rPr>
+            <a:t>Detection</a:t>
+          </a:r>
+          <a:endParaRPr lang="de-CH" dirty="0">
+            <a:latin typeface="Times New Roman" pitchFamily="18" charset="0"/>
+            <a:cs typeface="Times New Roman" pitchFamily="18" charset="0"/>
+          </a:endParaRPr>
+        </a:p>
+      </dgm:t>
+    </dgm:pt>
+    <dgm:pt modelId="{8573DED7-B362-42DD-851D-0B427146E0C2}" type="parTrans" cxnId="{8B0DC919-92D5-4716-A13C-EC06F7020C08}">
+      <dgm:prSet/>
+      <dgm:spPr/>
+      <dgm:t>
+        <a:bodyPr/>
+        <a:lstStyle/>
+        <a:p>
+          <a:endParaRPr lang="de-CH"/>
+        </a:p>
+      </dgm:t>
+    </dgm:pt>
+    <dgm:pt modelId="{03FFC18F-BC9E-48FB-9727-56618C3458C2}" type="sibTrans" cxnId="{8B0DC919-92D5-4716-A13C-EC06F7020C08}">
+      <dgm:prSet/>
+      <dgm:spPr/>
+      <dgm:t>
+        <a:bodyPr/>
+        <a:lstStyle/>
+        <a:p>
+          <a:endParaRPr lang="de-CH"/>
+        </a:p>
+      </dgm:t>
+    </dgm:pt>
+    <dgm:pt modelId="{1EC0C680-C011-47EE-AEC3-1A6FAABF108A}">
+      <dgm:prSet/>
+      <dgm:spPr/>
+      <dgm:t>
+        <a:bodyPr/>
+        <a:lstStyle/>
+        <a:p>
+          <a:r>
+            <a:rPr lang="de-CH" dirty="0" smtClean="0">
+              <a:latin typeface="Times New Roman" pitchFamily="18" charset="0"/>
+              <a:cs typeface="Times New Roman" pitchFamily="18" charset="0"/>
+            </a:rPr>
+            <a:t>Digital Output</a:t>
+          </a:r>
+          <a:endParaRPr lang="de-CH" dirty="0">
+            <a:latin typeface="Times New Roman" pitchFamily="18" charset="0"/>
+            <a:cs typeface="Times New Roman" pitchFamily="18" charset="0"/>
+          </a:endParaRPr>
+        </a:p>
+      </dgm:t>
+    </dgm:pt>
+    <dgm:pt modelId="{C052AD7E-9E9E-4AD6-9B4D-A85AAB1E77E4}" type="parTrans" cxnId="{01C4E691-5E50-4306-B103-D293D7B6BCF9}">
+      <dgm:prSet/>
+      <dgm:spPr/>
+      <dgm:t>
+        <a:bodyPr/>
+        <a:lstStyle/>
+        <a:p>
+          <a:endParaRPr lang="de-CH"/>
+        </a:p>
+      </dgm:t>
+    </dgm:pt>
+    <dgm:pt modelId="{F5A08D7E-FDC5-4481-BD37-00D5E57E2707}" type="sibTrans" cxnId="{01C4E691-5E50-4306-B103-D293D7B6BCF9}">
+      <dgm:prSet/>
+      <dgm:spPr/>
+      <dgm:t>
+        <a:bodyPr/>
+        <a:lstStyle/>
+        <a:p>
+          <a:endParaRPr lang="de-CH"/>
         </a:p>
       </dgm:t>
     </dgm:pt>
@@ -1453,7 +1532,7 @@
       <dgm:spPr/>
     </dgm:pt>
     <dgm:pt modelId="{A34DC4A7-2FE4-4CAD-9762-5A75455F8223}" type="pres">
-      <dgm:prSet presAssocID="{C14BD9F0-DCA9-4573-918D-BE09660960FA}" presName="Name37" presStyleLbl="parChTrans1D3" presStyleIdx="0" presStyleCnt="5"/>
+      <dgm:prSet presAssocID="{C14BD9F0-DCA9-4573-918D-BE09660960FA}" presName="Name37" presStyleLbl="parChTrans1D3" presStyleIdx="0" presStyleCnt="7"/>
       <dgm:spPr/>
       <dgm:t>
         <a:bodyPr/>
@@ -1476,7 +1555,7 @@
       <dgm:spPr/>
     </dgm:pt>
     <dgm:pt modelId="{990F1E99-A695-4581-8519-E018F6E8CCCA}" type="pres">
-      <dgm:prSet presAssocID="{3B1D5C9D-1B3B-4727-BC39-732DCD072D9C}" presName="rootText" presStyleLbl="node3" presStyleIdx="0" presStyleCnt="5">
+      <dgm:prSet presAssocID="{3B1D5C9D-1B3B-4727-BC39-732DCD072D9C}" presName="rootText" presStyleLbl="node3" presStyleIdx="0" presStyleCnt="7">
         <dgm:presLayoutVars>
           <dgm:chPref val="3"/>
         </dgm:presLayoutVars>
@@ -1491,7 +1570,7 @@
       </dgm:t>
     </dgm:pt>
     <dgm:pt modelId="{FF470902-0A31-4A33-AB3B-BE8D92E37571}" type="pres">
-      <dgm:prSet presAssocID="{3B1D5C9D-1B3B-4727-BC39-732DCD072D9C}" presName="rootConnector" presStyleLbl="node3" presStyleIdx="0" presStyleCnt="5"/>
+      <dgm:prSet presAssocID="{3B1D5C9D-1B3B-4727-BC39-732DCD072D9C}" presName="rootConnector" presStyleLbl="node3" presStyleIdx="0" presStyleCnt="7"/>
       <dgm:spPr/>
       <dgm:t>
         <a:bodyPr/>
@@ -1510,7 +1589,7 @@
       <dgm:spPr/>
     </dgm:pt>
     <dgm:pt modelId="{03157C86-6F1D-4BCF-9AC2-C54494E22353}" type="pres">
-      <dgm:prSet presAssocID="{EBE11D68-E435-4271-9FB8-7B8E5D209B94}" presName="Name37" presStyleLbl="parChTrans1D3" presStyleIdx="1" presStyleCnt="5"/>
+      <dgm:prSet presAssocID="{EBE11D68-E435-4271-9FB8-7B8E5D209B94}" presName="Name37" presStyleLbl="parChTrans1D3" presStyleIdx="1" presStyleCnt="7"/>
       <dgm:spPr/>
       <dgm:t>
         <a:bodyPr/>
@@ -1533,7 +1612,7 @@
       <dgm:spPr/>
     </dgm:pt>
     <dgm:pt modelId="{AAB359D6-13C1-48A5-A031-AA67724DC8CC}" type="pres">
-      <dgm:prSet presAssocID="{097D4F07-5945-4C9A-908F-8203B5E3F4A5}" presName="rootText" presStyleLbl="node3" presStyleIdx="1" presStyleCnt="5">
+      <dgm:prSet presAssocID="{097D4F07-5945-4C9A-908F-8203B5E3F4A5}" presName="rootText" presStyleLbl="node3" presStyleIdx="1" presStyleCnt="7">
         <dgm:presLayoutVars>
           <dgm:chPref val="3"/>
         </dgm:presLayoutVars>
@@ -1548,7 +1627,7 @@
       </dgm:t>
     </dgm:pt>
     <dgm:pt modelId="{DEAB9C75-1EC2-45AF-968D-7C30046C46DB}" type="pres">
-      <dgm:prSet presAssocID="{097D4F07-5945-4C9A-908F-8203B5E3F4A5}" presName="rootConnector" presStyleLbl="node3" presStyleIdx="1" presStyleCnt="5"/>
+      <dgm:prSet presAssocID="{097D4F07-5945-4C9A-908F-8203B5E3F4A5}" presName="rootConnector" presStyleLbl="node3" presStyleIdx="1" presStyleCnt="7"/>
       <dgm:spPr/>
       <dgm:t>
         <a:bodyPr/>
@@ -1567,7 +1646,7 @@
       <dgm:spPr/>
     </dgm:pt>
     <dgm:pt modelId="{85C4656D-4AFA-496B-9BA6-D4DFE034C918}" type="pres">
-      <dgm:prSet presAssocID="{8555CB35-396B-4587-95AD-6B4CB0D7F3FB}" presName="Name37" presStyleLbl="parChTrans1D3" presStyleIdx="2" presStyleCnt="5"/>
+      <dgm:prSet presAssocID="{8555CB35-396B-4587-95AD-6B4CB0D7F3FB}" presName="Name37" presStyleLbl="parChTrans1D3" presStyleIdx="2" presStyleCnt="7"/>
       <dgm:spPr/>
       <dgm:t>
         <a:bodyPr/>
@@ -1590,7 +1669,7 @@
       <dgm:spPr/>
     </dgm:pt>
     <dgm:pt modelId="{82DEAFC4-7013-4C49-90FF-005BCBA96AF7}" type="pres">
-      <dgm:prSet presAssocID="{FAEF16FE-D811-4B00-B106-2B2D1D968E0C}" presName="rootText" presStyleLbl="node3" presStyleIdx="2" presStyleCnt="5">
+      <dgm:prSet presAssocID="{FAEF16FE-D811-4B00-B106-2B2D1D968E0C}" presName="rootText" presStyleLbl="node3" presStyleIdx="2" presStyleCnt="7">
         <dgm:presLayoutVars>
           <dgm:chPref val="3"/>
         </dgm:presLayoutVars>
@@ -1605,7 +1684,7 @@
       </dgm:t>
     </dgm:pt>
     <dgm:pt modelId="{74E4734B-9220-4220-81D1-CFD3F0D6F4D0}" type="pres">
-      <dgm:prSet presAssocID="{FAEF16FE-D811-4B00-B106-2B2D1D968E0C}" presName="rootConnector" presStyleLbl="node3" presStyleIdx="2" presStyleCnt="5"/>
+      <dgm:prSet presAssocID="{FAEF16FE-D811-4B00-B106-2B2D1D968E0C}" presName="rootConnector" presStyleLbl="node3" presStyleIdx="2" presStyleCnt="7"/>
       <dgm:spPr/>
       <dgm:t>
         <a:bodyPr/>
@@ -1624,7 +1703,7 @@
       <dgm:spPr/>
     </dgm:pt>
     <dgm:pt modelId="{5B47B308-3C6A-4F12-B912-DDBFDE3E663A}" type="pres">
-      <dgm:prSet presAssocID="{C2C81BCC-7587-4065-8AD7-932794A7AA58}" presName="Name37" presStyleLbl="parChTrans1D3" presStyleIdx="3" presStyleCnt="5"/>
+      <dgm:prSet presAssocID="{C2C81BCC-7587-4065-8AD7-932794A7AA58}" presName="Name37" presStyleLbl="parChTrans1D3" presStyleIdx="3" presStyleCnt="7"/>
       <dgm:spPr/>
       <dgm:t>
         <a:bodyPr/>
@@ -1647,7 +1726,7 @@
       <dgm:spPr/>
     </dgm:pt>
     <dgm:pt modelId="{FFFACED5-1680-4175-8D67-D039E2442676}" type="pres">
-      <dgm:prSet presAssocID="{41AE446E-40AA-4AFF-80DD-7ADB7FC70BB6}" presName="rootText" presStyleLbl="node3" presStyleIdx="3" presStyleCnt="5">
+      <dgm:prSet presAssocID="{41AE446E-40AA-4AFF-80DD-7ADB7FC70BB6}" presName="rootText" presStyleLbl="node3" presStyleIdx="3" presStyleCnt="7">
         <dgm:presLayoutVars>
           <dgm:chPref val="3"/>
         </dgm:presLayoutVars>
@@ -1662,7 +1741,7 @@
       </dgm:t>
     </dgm:pt>
     <dgm:pt modelId="{93E1C3A0-E716-4DDA-B257-30E347E7215E}" type="pres">
-      <dgm:prSet presAssocID="{41AE446E-40AA-4AFF-80DD-7ADB7FC70BB6}" presName="rootConnector" presStyleLbl="node3" presStyleIdx="3" presStyleCnt="5"/>
+      <dgm:prSet presAssocID="{41AE446E-40AA-4AFF-80DD-7ADB7FC70BB6}" presName="rootConnector" presStyleLbl="node3" presStyleIdx="3" presStyleCnt="7"/>
       <dgm:spPr/>
       <dgm:t>
         <a:bodyPr/>
@@ -1681,7 +1760,7 @@
       <dgm:spPr/>
     </dgm:pt>
     <dgm:pt modelId="{236DA163-9731-42DD-89D1-BDA31EC3DE57}" type="pres">
-      <dgm:prSet presAssocID="{63AEA970-C12E-4DAD-8F05-4416E614579D}" presName="Name37" presStyleLbl="parChTrans1D3" presStyleIdx="4" presStyleCnt="5"/>
+      <dgm:prSet presAssocID="{63AEA970-C12E-4DAD-8F05-4416E614579D}" presName="Name37" presStyleLbl="parChTrans1D3" presStyleIdx="4" presStyleCnt="7"/>
       <dgm:spPr/>
       <dgm:t>
         <a:bodyPr/>
@@ -1704,7 +1783,7 @@
       <dgm:spPr/>
     </dgm:pt>
     <dgm:pt modelId="{FF91C15D-2083-4341-B308-CCDF3E932AC6}" type="pres">
-      <dgm:prSet presAssocID="{E6AD5B84-027C-4CB3-80EB-468E9BC31B77}" presName="rootText" presStyleLbl="node3" presStyleIdx="4" presStyleCnt="5">
+      <dgm:prSet presAssocID="{E6AD5B84-027C-4CB3-80EB-468E9BC31B77}" presName="rootText" presStyleLbl="node3" presStyleIdx="4" presStyleCnt="7">
         <dgm:presLayoutVars>
           <dgm:chPref val="3"/>
         </dgm:presLayoutVars>
@@ -1719,7 +1798,7 @@
       </dgm:t>
     </dgm:pt>
     <dgm:pt modelId="{65B23F0C-903C-4B6E-9946-FB8121A17663}" type="pres">
-      <dgm:prSet presAssocID="{E6AD5B84-027C-4CB3-80EB-468E9BC31B77}" presName="rootConnector" presStyleLbl="node3" presStyleIdx="4" presStyleCnt="5"/>
+      <dgm:prSet presAssocID="{E6AD5B84-027C-4CB3-80EB-468E9BC31B77}" presName="rootConnector" presStyleLbl="node3" presStyleIdx="4" presStyleCnt="7"/>
       <dgm:spPr/>
       <dgm:t>
         <a:bodyPr/>
@@ -1851,6 +1930,92 @@
       <dgm:prSet presAssocID="{7294BCCD-8428-45FB-9FA8-0272A7148635}" presName="hierChild4" presStyleCnt="0"/>
       <dgm:spPr/>
     </dgm:pt>
+    <dgm:pt modelId="{782140CC-1831-4D5B-84BD-5C22B85266E5}" type="pres">
+      <dgm:prSet presAssocID="{8573DED7-B362-42DD-851D-0B427146E0C2}" presName="Name37" presStyleLbl="parChTrans1D3" presStyleIdx="5" presStyleCnt="7"/>
+      <dgm:spPr/>
+    </dgm:pt>
+    <dgm:pt modelId="{21BAAFEA-D012-4A14-8F25-BE56F0495A3B}" type="pres">
+      <dgm:prSet presAssocID="{AE33D4D4-1E84-4A41-85C9-B50BF719633E}" presName="hierRoot2" presStyleCnt="0">
+        <dgm:presLayoutVars>
+          <dgm:hierBranch val="init"/>
+        </dgm:presLayoutVars>
+      </dgm:prSet>
+      <dgm:spPr/>
+    </dgm:pt>
+    <dgm:pt modelId="{1895C86F-F99D-468C-B532-8B4C2A9A81B5}" type="pres">
+      <dgm:prSet presAssocID="{AE33D4D4-1E84-4A41-85C9-B50BF719633E}" presName="rootComposite" presStyleCnt="0"/>
+      <dgm:spPr/>
+    </dgm:pt>
+    <dgm:pt modelId="{B6DBE3EE-A757-473A-A921-D12B9091962B}" type="pres">
+      <dgm:prSet presAssocID="{AE33D4D4-1E84-4A41-85C9-B50BF719633E}" presName="rootText" presStyleLbl="node3" presStyleIdx="5" presStyleCnt="7">
+        <dgm:presLayoutVars>
+          <dgm:chPref val="3"/>
+        </dgm:presLayoutVars>
+      </dgm:prSet>
+      <dgm:spPr/>
+      <dgm:t>
+        <a:bodyPr/>
+        <a:lstStyle/>
+        <a:p>
+          <a:endParaRPr lang="de-CH"/>
+        </a:p>
+      </dgm:t>
+    </dgm:pt>
+    <dgm:pt modelId="{D35BF64C-6B3D-4868-8C18-C98D8BAC4848}" type="pres">
+      <dgm:prSet presAssocID="{AE33D4D4-1E84-4A41-85C9-B50BF719633E}" presName="rootConnector" presStyleLbl="node3" presStyleIdx="5" presStyleCnt="7"/>
+      <dgm:spPr/>
+    </dgm:pt>
+    <dgm:pt modelId="{0252F2EE-A5EA-4C41-802D-996227820C0B}" type="pres">
+      <dgm:prSet presAssocID="{AE33D4D4-1E84-4A41-85C9-B50BF719633E}" presName="hierChild4" presStyleCnt="0"/>
+      <dgm:spPr/>
+    </dgm:pt>
+    <dgm:pt modelId="{749AF3C5-A9C0-4D94-8518-85F29D7F50BA}" type="pres">
+      <dgm:prSet presAssocID="{AE33D4D4-1E84-4A41-85C9-B50BF719633E}" presName="hierChild5" presStyleCnt="0"/>
+      <dgm:spPr/>
+    </dgm:pt>
+    <dgm:pt modelId="{A63E9D40-E19C-42CB-BBB7-B953CD51A6F5}" type="pres">
+      <dgm:prSet presAssocID="{C052AD7E-9E9E-4AD6-9B4D-A85AAB1E77E4}" presName="Name37" presStyleLbl="parChTrans1D3" presStyleIdx="6" presStyleCnt="7"/>
+      <dgm:spPr/>
+    </dgm:pt>
+    <dgm:pt modelId="{3F72F00A-2E97-435B-9BD7-8AD125ECC56D}" type="pres">
+      <dgm:prSet presAssocID="{1EC0C680-C011-47EE-AEC3-1A6FAABF108A}" presName="hierRoot2" presStyleCnt="0">
+        <dgm:presLayoutVars>
+          <dgm:hierBranch val="init"/>
+        </dgm:presLayoutVars>
+      </dgm:prSet>
+      <dgm:spPr/>
+    </dgm:pt>
+    <dgm:pt modelId="{8D20C6BB-020E-4123-988B-F26CE84C7E74}" type="pres">
+      <dgm:prSet presAssocID="{1EC0C680-C011-47EE-AEC3-1A6FAABF108A}" presName="rootComposite" presStyleCnt="0"/>
+      <dgm:spPr/>
+    </dgm:pt>
+    <dgm:pt modelId="{10D03729-DDCA-44E2-BFF2-87534A7CB523}" type="pres">
+      <dgm:prSet presAssocID="{1EC0C680-C011-47EE-AEC3-1A6FAABF108A}" presName="rootText" presStyleLbl="node3" presStyleIdx="6" presStyleCnt="7">
+        <dgm:presLayoutVars>
+          <dgm:chPref val="3"/>
+        </dgm:presLayoutVars>
+      </dgm:prSet>
+      <dgm:spPr/>
+      <dgm:t>
+        <a:bodyPr/>
+        <a:lstStyle/>
+        <a:p>
+          <a:endParaRPr lang="de-CH"/>
+        </a:p>
+      </dgm:t>
+    </dgm:pt>
+    <dgm:pt modelId="{01156B48-DAAB-4072-B187-18611A710B17}" type="pres">
+      <dgm:prSet presAssocID="{1EC0C680-C011-47EE-AEC3-1A6FAABF108A}" presName="rootConnector" presStyleLbl="node3" presStyleIdx="6" presStyleCnt="7"/>
+      <dgm:spPr/>
+    </dgm:pt>
+    <dgm:pt modelId="{ABD9EE98-67E8-4E95-9DB7-BEAF7B41F58B}" type="pres">
+      <dgm:prSet presAssocID="{1EC0C680-C011-47EE-AEC3-1A6FAABF108A}" presName="hierChild4" presStyleCnt="0"/>
+      <dgm:spPr/>
+    </dgm:pt>
+    <dgm:pt modelId="{69ECB842-B2A2-4142-99D1-CE3E12BB0418}" type="pres">
+      <dgm:prSet presAssocID="{1EC0C680-C011-47EE-AEC3-1A6FAABF108A}" presName="hierChild5" presStyleCnt="0"/>
+      <dgm:spPr/>
+    </dgm:pt>
     <dgm:pt modelId="{D5165DAF-3112-4004-B58A-82C763DCFBB1}" type="pres">
       <dgm:prSet presAssocID="{7294BCCD-8428-45FB-9FA8-0272A7148635}" presName="hierChild5" presStyleCnt="0"/>
       <dgm:spPr/>
@@ -1864,6 +2029,7 @@
     <dgm:cxn modelId="{9A961C39-5D5E-4C89-A6B1-B6F237802C35}" srcId="{D9E822FA-86F7-4E74-A2B1-408B7DC197E9}" destId="{077E1A0C-035C-408D-9A4E-F3264F71A77E}" srcOrd="0" destOrd="0" parTransId="{8A3FB2E0-C66F-473D-8591-C9DCA06317A2}" sibTransId="{B7BC2464-AB0A-48CF-B5C1-488979B729D8}"/>
     <dgm:cxn modelId="{98CAE27C-89B0-4BC5-AFFA-2D645715D8C2}" type="presOf" srcId="{D9E822FA-86F7-4E74-A2B1-408B7DC197E9}" destId="{0B474603-98E1-423D-A8D7-0EAAEA8D28A8}" srcOrd="0" destOrd="0" presId="urn:microsoft.com/office/officeart/2005/8/layout/orgChart1"/>
     <dgm:cxn modelId="{3B214FF5-8CB5-40F2-8DE7-A566760A050F}" type="presOf" srcId="{097D4F07-5945-4C9A-908F-8203B5E3F4A5}" destId="{AAB359D6-13C1-48A5-A031-AA67724DC8CC}" srcOrd="0" destOrd="0" presId="urn:microsoft.com/office/officeart/2005/8/layout/orgChart1"/>
+    <dgm:cxn modelId="{DC1AE426-E1BE-49C2-993D-5606CB79C140}" type="presOf" srcId="{C052AD7E-9E9E-4AD6-9B4D-A85AAB1E77E4}" destId="{A63E9D40-E19C-42CB-BBB7-B953CD51A6F5}" srcOrd="0" destOrd="0" presId="urn:microsoft.com/office/officeart/2005/8/layout/orgChart1"/>
     <dgm:cxn modelId="{8734485D-18E2-4129-BA9F-52D5FBBFCB01}" type="presOf" srcId="{3B1D5C9D-1B3B-4727-BC39-732DCD072D9C}" destId="{990F1E99-A695-4581-8519-E018F6E8CCCA}" srcOrd="0" destOrd="0" presId="urn:microsoft.com/office/officeart/2005/8/layout/orgChart1"/>
     <dgm:cxn modelId="{B7BC98D9-7D45-4F35-B52C-26204D0DA2D8}" type="presOf" srcId="{D9E822FA-86F7-4E74-A2B1-408B7DC197E9}" destId="{D95052C0-45EA-4D49-96D8-F4776A73BD3A}" srcOrd="1" destOrd="0" presId="urn:microsoft.com/office/officeart/2005/8/layout/orgChart1"/>
     <dgm:cxn modelId="{6514622C-5DCF-4A5E-9F1F-E368534240DF}" srcId="{077E1A0C-035C-408D-9A4E-F3264F71A77E}" destId="{3B1D5C9D-1B3B-4727-BC39-732DCD072D9C}" srcOrd="0" destOrd="0" parTransId="{C14BD9F0-DCA9-4573-918D-BE09660960FA}" sibTransId="{694B9929-8222-4067-8FEA-82EDE0D2A566}"/>
@@ -1876,22 +2042,29 @@
     <dgm:cxn modelId="{A78981E2-5DE7-4E3B-9DB4-B09C19F8CCAA}" type="presOf" srcId="{077E1A0C-035C-408D-9A4E-F3264F71A77E}" destId="{BBF84515-FC3F-41E2-B0C0-F014B6235713}" srcOrd="1" destOrd="0" presId="urn:microsoft.com/office/officeart/2005/8/layout/orgChart1"/>
     <dgm:cxn modelId="{0505A684-C212-41FD-A86A-E978E4EEF45D}" type="presOf" srcId="{077E1A0C-035C-408D-9A4E-F3264F71A77E}" destId="{FC202ED4-908B-4200-AF9B-051438217CD8}" srcOrd="0" destOrd="0" presId="urn:microsoft.com/office/officeart/2005/8/layout/orgChart1"/>
     <dgm:cxn modelId="{3187B5E7-D479-45E6-B93E-879C02FD40C8}" type="presOf" srcId="{7294BCCD-8428-45FB-9FA8-0272A7148635}" destId="{11DE7EC6-3B68-4B19-A911-1C78897C8567}" srcOrd="1" destOrd="0" presId="urn:microsoft.com/office/officeart/2005/8/layout/orgChart1"/>
+    <dgm:cxn modelId="{3A3AFA0D-D9C4-4907-AD7A-4BB5D1BE1D4A}" type="presOf" srcId="{AE33D4D4-1E84-4A41-85C9-B50BF719633E}" destId="{B6DBE3EE-A757-473A-A921-D12B9091962B}" srcOrd="0" destOrd="0" presId="urn:microsoft.com/office/officeart/2005/8/layout/orgChart1"/>
     <dgm:cxn modelId="{0EC83C4E-5C01-45EC-B107-E92546508EC2}" type="presOf" srcId="{C14BD9F0-DCA9-4573-918D-BE09660960FA}" destId="{A34DC4A7-2FE4-4CAD-9762-5A75455F8223}" srcOrd="0" destOrd="0" presId="urn:microsoft.com/office/officeart/2005/8/layout/orgChart1"/>
     <dgm:cxn modelId="{1A6DD142-3E02-4964-B32E-F58D5AC2EA6F}" type="presOf" srcId="{54FD3DF5-C9BF-4591-8AD0-6310EB15E6BB}" destId="{7CD35B9D-59CC-4661-B886-4612CDD9A0DA}" srcOrd="0" destOrd="0" presId="urn:microsoft.com/office/officeart/2005/8/layout/orgChart1"/>
     <dgm:cxn modelId="{BE8E0D24-B7AE-41B7-B535-577299279F11}" type="presOf" srcId="{8555CB35-396B-4587-95AD-6B4CB0D7F3FB}" destId="{85C4656D-4AFA-496B-9BA6-D4DFE034C918}" srcOrd="0" destOrd="0" presId="urn:microsoft.com/office/officeart/2005/8/layout/orgChart1"/>
+    <dgm:cxn modelId="{8B0DC919-92D5-4716-A13C-EC06F7020C08}" srcId="{7294BCCD-8428-45FB-9FA8-0272A7148635}" destId="{AE33D4D4-1E84-4A41-85C9-B50BF719633E}" srcOrd="0" destOrd="0" parTransId="{8573DED7-B362-42DD-851D-0B427146E0C2}" sibTransId="{03FFC18F-BC9E-48FB-9727-56618C3458C2}"/>
     <dgm:cxn modelId="{73C5F8D7-1BD7-4315-AF98-675D3B26D874}" type="presOf" srcId="{3B1D5C9D-1B3B-4727-BC39-732DCD072D9C}" destId="{FF470902-0A31-4A33-AB3B-BE8D92E37571}" srcOrd="1" destOrd="0" presId="urn:microsoft.com/office/officeart/2005/8/layout/orgChart1"/>
     <dgm:cxn modelId="{46A7BE79-3335-441F-9513-F59115BDF3F2}" srcId="{077E1A0C-035C-408D-9A4E-F3264F71A77E}" destId="{FAEF16FE-D811-4B00-B106-2B2D1D968E0C}" srcOrd="2" destOrd="0" parTransId="{8555CB35-396B-4587-95AD-6B4CB0D7F3FB}" sibTransId="{65D20479-FED8-4D52-998E-A2D44E2ED57E}"/>
     <dgm:cxn modelId="{31C7163E-6B05-4FFC-8DB4-E3E3E1258D72}" srcId="{077E1A0C-035C-408D-9A4E-F3264F71A77E}" destId="{41AE446E-40AA-4AFF-80DD-7ADB7FC70BB6}" srcOrd="3" destOrd="0" parTransId="{C2C81BCC-7587-4065-8AD7-932794A7AA58}" sibTransId="{63974C15-6085-4649-B5CA-85A977D8A5A9}"/>
     <dgm:cxn modelId="{CC1723AD-7352-4392-822B-0E9EE401DFE4}" type="presOf" srcId="{63AEA970-C12E-4DAD-8F05-4416E614579D}" destId="{236DA163-9731-42DD-89D1-BDA31EC3DE57}" srcOrd="0" destOrd="0" presId="urn:microsoft.com/office/officeart/2005/8/layout/orgChart1"/>
     <dgm:cxn modelId="{CA87036A-21A6-4D75-AC52-4DE8FC952AFE}" type="presOf" srcId="{7294BCCD-8428-45FB-9FA8-0272A7148635}" destId="{E607B41E-5BEA-4AC7-8FF1-AD2BBB35119E}" srcOrd="0" destOrd="0" presId="urn:microsoft.com/office/officeart/2005/8/layout/orgChart1"/>
+    <dgm:cxn modelId="{3E3FD828-09B2-424E-A269-AD46E96654F0}" type="presOf" srcId="{AE33D4D4-1E84-4A41-85C9-B50BF719633E}" destId="{D35BF64C-6B3D-4868-8C18-C98D8BAC4848}" srcOrd="1" destOrd="0" presId="urn:microsoft.com/office/officeart/2005/8/layout/orgChart1"/>
     <dgm:cxn modelId="{9108FE1C-953D-4C52-A42C-387B82C79760}" type="presOf" srcId="{41AE446E-40AA-4AFF-80DD-7ADB7FC70BB6}" destId="{FFFACED5-1680-4175-8D67-D039E2442676}" srcOrd="0" destOrd="0" presId="urn:microsoft.com/office/officeart/2005/8/layout/orgChart1"/>
     <dgm:cxn modelId="{37EF8837-C8E3-4AAC-96F0-B9A283CB8997}" type="presOf" srcId="{41AE446E-40AA-4AFF-80DD-7ADB7FC70BB6}" destId="{93E1C3A0-E716-4DDA-B257-30E347E7215E}" srcOrd="1" destOrd="0" presId="urn:microsoft.com/office/officeart/2005/8/layout/orgChart1"/>
     <dgm:cxn modelId="{4DD66837-B76D-40F1-AA50-56DA1C7286EE}" type="presOf" srcId="{097D4F07-5945-4C9A-908F-8203B5E3F4A5}" destId="{DEAB9C75-1EC2-45AF-968D-7C30046C46DB}" srcOrd="1" destOrd="0" presId="urn:microsoft.com/office/officeart/2005/8/layout/orgChart1"/>
+    <dgm:cxn modelId="{4DAD534F-8472-4077-ABD4-16E769C7652A}" type="presOf" srcId="{1EC0C680-C011-47EE-AEC3-1A6FAABF108A}" destId="{01156B48-DAAB-4072-B187-18611A710B17}" srcOrd="1" destOrd="0" presId="urn:microsoft.com/office/officeart/2005/8/layout/orgChart1"/>
     <dgm:cxn modelId="{CAD69B17-AD53-4F1E-8C39-500ED41A0F00}" srcId="{077E1A0C-035C-408D-9A4E-F3264F71A77E}" destId="{097D4F07-5945-4C9A-908F-8203B5E3F4A5}" srcOrd="1" destOrd="0" parTransId="{EBE11D68-E435-4271-9FB8-7B8E5D209B94}" sibTransId="{F75118F3-24A2-4BD2-9262-6DED937FF584}"/>
     <dgm:cxn modelId="{703A4C33-30E9-49FF-B276-BB695CAB95F5}" type="presOf" srcId="{3BD00221-CDA0-4927-8E5E-38B5319D9E08}" destId="{9AB4AB9B-EC26-49AD-AA2E-947D647ECC9B}" srcOrd="0" destOrd="0" presId="urn:microsoft.com/office/officeart/2005/8/layout/orgChart1"/>
+    <dgm:cxn modelId="{2D8F1438-1C7E-4ACB-9165-44B7822CE536}" type="presOf" srcId="{8573DED7-B362-42DD-851D-0B427146E0C2}" destId="{782140CC-1831-4D5B-84BD-5C22B85266E5}" srcOrd="0" destOrd="0" presId="urn:microsoft.com/office/officeart/2005/8/layout/orgChart1"/>
     <dgm:cxn modelId="{6C54E35C-156A-47FD-A789-F2C0A998E440}" type="presOf" srcId="{EBE11D68-E435-4271-9FB8-7B8E5D209B94}" destId="{03157C86-6F1D-4BCF-9AC2-C54494E22353}" srcOrd="0" destOrd="0" presId="urn:microsoft.com/office/officeart/2005/8/layout/orgChart1"/>
+    <dgm:cxn modelId="{53A99AA1-4263-4A99-BA02-293A902C66B3}" type="presOf" srcId="{1EC0C680-C011-47EE-AEC3-1A6FAABF108A}" destId="{10D03729-DDCA-44E2-BFF2-87534A7CB523}" srcOrd="0" destOrd="0" presId="urn:microsoft.com/office/officeart/2005/8/layout/orgChart1"/>
     <dgm:cxn modelId="{5D76D57C-0D64-4074-87BF-0EF06908E825}" type="presOf" srcId="{C2C81BCC-7587-4065-8AD7-932794A7AA58}" destId="{5B47B308-3C6A-4F12-B912-DDBFDE3E663A}" srcOrd="0" destOrd="0" presId="urn:microsoft.com/office/officeart/2005/8/layout/orgChart1"/>
     <dgm:cxn modelId="{DBE9D92F-EC24-4C68-8CCF-FC4028EA3331}" type="presOf" srcId="{63315083-575E-4254-86E6-1FCB1671432F}" destId="{C1E079F8-98A4-43E3-BF87-E43EF3B13FE5}" srcOrd="1" destOrd="0" presId="urn:microsoft.com/office/officeart/2005/8/layout/orgChart1"/>
+    <dgm:cxn modelId="{01C4E691-5E50-4306-B103-D293D7B6BCF9}" srcId="{7294BCCD-8428-45FB-9FA8-0272A7148635}" destId="{1EC0C680-C011-47EE-AEC3-1A6FAABF108A}" srcOrd="1" destOrd="0" parTransId="{C052AD7E-9E9E-4AD6-9B4D-A85AAB1E77E4}" sibTransId="{F5A08D7E-FDC5-4481-BD37-00D5E57E2707}"/>
     <dgm:cxn modelId="{67210DB5-ED78-4898-B8A5-BA0001C880A5}" type="presOf" srcId="{E6AD5B84-027C-4CB3-80EB-468E9BC31B77}" destId="{FF91C15D-2083-4341-B308-CCDF3E932AC6}" srcOrd="0" destOrd="0" presId="urn:microsoft.com/office/officeart/2005/8/layout/orgChart1"/>
     <dgm:cxn modelId="{F5CAAEEA-BF16-48B6-862B-891C3CD34523}" type="presOf" srcId="{E6AD5B84-027C-4CB3-80EB-468E9BC31B77}" destId="{65B23F0C-903C-4B6E-9946-FB8121A17663}" srcOrd="1" destOrd="0" presId="urn:microsoft.com/office/officeart/2005/8/layout/orgChart1"/>
     <dgm:cxn modelId="{5CE0417F-4389-4844-AD10-C1EF33F33F49}" type="presOf" srcId="{63315083-575E-4254-86E6-1FCB1671432F}" destId="{52790859-F0BE-4DDB-8C69-1B5BB45A74E7}" srcOrd="0" destOrd="0" presId="urn:microsoft.com/office/officeart/2005/8/layout/orgChart1"/>
@@ -1957,6 +2130,20 @@
     <dgm:cxn modelId="{2002BBFC-F258-47FB-8DC9-1BF84D301A7C}" type="presParOf" srcId="{FF075FA4-F613-4620-8B81-E9C98A2BEC16}" destId="{E607B41E-5BEA-4AC7-8FF1-AD2BBB35119E}" srcOrd="0" destOrd="0" presId="urn:microsoft.com/office/officeart/2005/8/layout/orgChart1"/>
     <dgm:cxn modelId="{DE61BEB9-FC78-4E50-855A-FD2126D0E96F}" type="presParOf" srcId="{FF075FA4-F613-4620-8B81-E9C98A2BEC16}" destId="{11DE7EC6-3B68-4B19-A911-1C78897C8567}" srcOrd="1" destOrd="0" presId="urn:microsoft.com/office/officeart/2005/8/layout/orgChart1"/>
     <dgm:cxn modelId="{A0B0008D-790A-466D-B6CC-7A393357865B}" type="presParOf" srcId="{8CD2EAFB-1A41-44C6-AD9B-9462DF3760DA}" destId="{88B295C6-A2FC-4331-9BC2-7B7488149E9E}" srcOrd="1" destOrd="0" presId="urn:microsoft.com/office/officeart/2005/8/layout/orgChart1"/>
+    <dgm:cxn modelId="{EA855ECF-ED2B-44A9-BD8B-A84DCCE6D047}" type="presParOf" srcId="{88B295C6-A2FC-4331-9BC2-7B7488149E9E}" destId="{782140CC-1831-4D5B-84BD-5C22B85266E5}" srcOrd="0" destOrd="0" presId="urn:microsoft.com/office/officeart/2005/8/layout/orgChart1"/>
+    <dgm:cxn modelId="{666DAE27-9FF8-4F54-9055-FA099FBC11BA}" type="presParOf" srcId="{88B295C6-A2FC-4331-9BC2-7B7488149E9E}" destId="{21BAAFEA-D012-4A14-8F25-BE56F0495A3B}" srcOrd="1" destOrd="0" presId="urn:microsoft.com/office/officeart/2005/8/layout/orgChart1"/>
+    <dgm:cxn modelId="{1EE3D03E-3C81-498D-A502-65777A191B88}" type="presParOf" srcId="{21BAAFEA-D012-4A14-8F25-BE56F0495A3B}" destId="{1895C86F-F99D-468C-B532-8B4C2A9A81B5}" srcOrd="0" destOrd="0" presId="urn:microsoft.com/office/officeart/2005/8/layout/orgChart1"/>
+    <dgm:cxn modelId="{500EB393-2DDD-441E-9968-AC8EB6073A36}" type="presParOf" srcId="{1895C86F-F99D-468C-B532-8B4C2A9A81B5}" destId="{B6DBE3EE-A757-473A-A921-D12B9091962B}" srcOrd="0" destOrd="0" presId="urn:microsoft.com/office/officeart/2005/8/layout/orgChart1"/>
+    <dgm:cxn modelId="{2C225BF7-6620-4F9E-BEC7-9427091049FB}" type="presParOf" srcId="{1895C86F-F99D-468C-B532-8B4C2A9A81B5}" destId="{D35BF64C-6B3D-4868-8C18-C98D8BAC4848}" srcOrd="1" destOrd="0" presId="urn:microsoft.com/office/officeart/2005/8/layout/orgChart1"/>
+    <dgm:cxn modelId="{D601FD15-6764-41FC-80A9-886CE1574196}" type="presParOf" srcId="{21BAAFEA-D012-4A14-8F25-BE56F0495A3B}" destId="{0252F2EE-A5EA-4C41-802D-996227820C0B}" srcOrd="1" destOrd="0" presId="urn:microsoft.com/office/officeart/2005/8/layout/orgChart1"/>
+    <dgm:cxn modelId="{DBB17D30-EB70-4042-A680-60311842B75B}" type="presParOf" srcId="{21BAAFEA-D012-4A14-8F25-BE56F0495A3B}" destId="{749AF3C5-A9C0-4D94-8518-85F29D7F50BA}" srcOrd="2" destOrd="0" presId="urn:microsoft.com/office/officeart/2005/8/layout/orgChart1"/>
+    <dgm:cxn modelId="{EC52EEAF-6BB2-40F9-9F3A-8A57B8228C17}" type="presParOf" srcId="{88B295C6-A2FC-4331-9BC2-7B7488149E9E}" destId="{A63E9D40-E19C-42CB-BBB7-B953CD51A6F5}" srcOrd="2" destOrd="0" presId="urn:microsoft.com/office/officeart/2005/8/layout/orgChart1"/>
+    <dgm:cxn modelId="{531017CF-4EB8-47AA-8644-53330831FF45}" type="presParOf" srcId="{88B295C6-A2FC-4331-9BC2-7B7488149E9E}" destId="{3F72F00A-2E97-435B-9BD7-8AD125ECC56D}" srcOrd="3" destOrd="0" presId="urn:microsoft.com/office/officeart/2005/8/layout/orgChart1"/>
+    <dgm:cxn modelId="{A9A4E364-5B55-4237-B980-C4F5378C4B49}" type="presParOf" srcId="{3F72F00A-2E97-435B-9BD7-8AD125ECC56D}" destId="{8D20C6BB-020E-4123-988B-F26CE84C7E74}" srcOrd="0" destOrd="0" presId="urn:microsoft.com/office/officeart/2005/8/layout/orgChart1"/>
+    <dgm:cxn modelId="{FA197653-8DAA-4577-9649-4A35B7070C61}" type="presParOf" srcId="{8D20C6BB-020E-4123-988B-F26CE84C7E74}" destId="{10D03729-DDCA-44E2-BFF2-87534A7CB523}" srcOrd="0" destOrd="0" presId="urn:microsoft.com/office/officeart/2005/8/layout/orgChart1"/>
+    <dgm:cxn modelId="{23AF0812-B682-4B2C-8FCA-7CC93C4FAB84}" type="presParOf" srcId="{8D20C6BB-020E-4123-988B-F26CE84C7E74}" destId="{01156B48-DAAB-4072-B187-18611A710B17}" srcOrd="1" destOrd="0" presId="urn:microsoft.com/office/officeart/2005/8/layout/orgChart1"/>
+    <dgm:cxn modelId="{B708E3FB-EE13-48F9-ADA0-9C7B40E27F06}" type="presParOf" srcId="{3F72F00A-2E97-435B-9BD7-8AD125ECC56D}" destId="{ABD9EE98-67E8-4E95-9DB7-BEAF7B41F58B}" srcOrd="1" destOrd="0" presId="urn:microsoft.com/office/officeart/2005/8/layout/orgChart1"/>
+    <dgm:cxn modelId="{5ABB06C0-0DDE-4EFF-945E-6819061C913A}" type="presParOf" srcId="{3F72F00A-2E97-435B-9BD7-8AD125ECC56D}" destId="{69ECB842-B2A2-4142-99D1-CE3E12BB0418}" srcOrd="2" destOrd="0" presId="urn:microsoft.com/office/officeart/2005/8/layout/orgChart1"/>
     <dgm:cxn modelId="{9B0DB72A-B245-4E6D-9771-52BE9ECF1C1B}" type="presParOf" srcId="{8CD2EAFB-1A41-44C6-AD9B-9462DF3760DA}" destId="{D5165DAF-3112-4004-B58A-82C763DCFBB1}" srcOrd="2" destOrd="0" presId="urn:microsoft.com/office/officeart/2005/8/layout/orgChart1"/>
     <dgm:cxn modelId="{C29BFED6-C98F-4B1C-BEAB-E70AC79EB0A1}" type="presParOf" srcId="{6F88D1E6-0E67-407A-8B22-30547390917A}" destId="{76F80AB9-6B62-43B2-A582-56891B5DC918}" srcOrd="2" destOrd="0" presId="urn:microsoft.com/office/officeart/2005/8/layout/orgChart1"/>
   </dgm:cxnLst>
@@ -1978,6 +2165,122 @@
       <dsp:cNvGrpSpPr/>
     </dsp:nvGrpSpPr>
     <dsp:grpSpPr/>
+    <dsp:sp modelId="{A63E9D40-E19C-42CB-BBB7-B953CD51A6F5}">
+      <dsp:nvSpPr>
+        <dsp:cNvPr id="0" name=""/>
+        <dsp:cNvSpPr/>
+      </dsp:nvSpPr>
+      <dsp:spPr>
+        <a:xfrm>
+          <a:off x="3632285" y="1034023"/>
+          <a:ext cx="127945" cy="997976"/>
+        </a:xfrm>
+        <a:custGeom>
+          <a:avLst/>
+          <a:gdLst/>
+          <a:ahLst/>
+          <a:cxnLst/>
+          <a:rect l="0" t="0" r="0" b="0"/>
+          <a:pathLst>
+            <a:path>
+              <a:moveTo>
+                <a:pt x="0" y="0"/>
+              </a:moveTo>
+              <a:lnTo>
+                <a:pt x="0" y="997976"/>
+              </a:lnTo>
+              <a:lnTo>
+                <a:pt x="127945" y="997976"/>
+              </a:lnTo>
+            </a:path>
+          </a:pathLst>
+        </a:custGeom>
+        <a:noFill/>
+        <a:ln w="25400" cap="flat" cmpd="sng" algn="ctr">
+          <a:solidFill>
+            <a:schemeClr val="accent1">
+              <a:shade val="80000"/>
+              <a:hueOff val="0"/>
+              <a:satOff val="0"/>
+              <a:lumOff val="0"/>
+              <a:alphaOff val="0"/>
+            </a:schemeClr>
+          </a:solidFill>
+          <a:prstDash val="solid"/>
+        </a:ln>
+        <a:effectLst/>
+      </dsp:spPr>
+      <dsp:style>
+        <a:lnRef idx="2">
+          <a:scrgbClr r="0" g="0" b="0"/>
+        </a:lnRef>
+        <a:fillRef idx="0">
+          <a:scrgbClr r="0" g="0" b="0"/>
+        </a:fillRef>
+        <a:effectRef idx="0">
+          <a:scrgbClr r="0" g="0" b="0"/>
+        </a:effectRef>
+        <a:fontRef idx="minor"/>
+      </dsp:style>
+    </dsp:sp>
+    <dsp:sp modelId="{782140CC-1831-4D5B-84BD-5C22B85266E5}">
+      <dsp:nvSpPr>
+        <dsp:cNvPr id="0" name=""/>
+        <dsp:cNvSpPr/>
+      </dsp:nvSpPr>
+      <dsp:spPr>
+        <a:xfrm>
+          <a:off x="3632285" y="1034023"/>
+          <a:ext cx="127945" cy="392366"/>
+        </a:xfrm>
+        <a:custGeom>
+          <a:avLst/>
+          <a:gdLst/>
+          <a:ahLst/>
+          <a:cxnLst/>
+          <a:rect l="0" t="0" r="0" b="0"/>
+          <a:pathLst>
+            <a:path>
+              <a:moveTo>
+                <a:pt x="0" y="0"/>
+              </a:moveTo>
+              <a:lnTo>
+                <a:pt x="0" y="392366"/>
+              </a:lnTo>
+              <a:lnTo>
+                <a:pt x="127945" y="392366"/>
+              </a:lnTo>
+            </a:path>
+          </a:pathLst>
+        </a:custGeom>
+        <a:noFill/>
+        <a:ln w="25400" cap="flat" cmpd="sng" algn="ctr">
+          <a:solidFill>
+            <a:schemeClr val="accent1">
+              <a:shade val="80000"/>
+              <a:hueOff val="0"/>
+              <a:satOff val="0"/>
+              <a:lumOff val="0"/>
+              <a:alphaOff val="0"/>
+            </a:schemeClr>
+          </a:solidFill>
+          <a:prstDash val="solid"/>
+        </a:ln>
+        <a:effectLst/>
+      </dsp:spPr>
+      <dsp:style>
+        <a:lnRef idx="2">
+          <a:scrgbClr r="0" g="0" b="0"/>
+        </a:lnRef>
+        <a:fillRef idx="0">
+          <a:scrgbClr r="0" g="0" b="0"/>
+        </a:fillRef>
+        <a:effectRef idx="0">
+          <a:scrgbClr r="0" g="0" b="0"/>
+        </a:effectRef>
+        <a:fontRef idx="minor"/>
+      </dsp:style>
+    </dsp:sp>
     <dsp:sp modelId="{9AB4AB9B-EC26-49AD-AA2E-947D647ECC9B}">
       <dsp:nvSpPr>
         <dsp:cNvPr id="0" name=""/>
@@ -1985,7 +2288,7 @@
       </dsp:nvSpPr>
       <dsp:spPr>
         <a:xfrm>
-          <a:off x="3048000" y="428414"/>
+          <a:off x="2941378" y="428414"/>
           <a:ext cx="1032095" cy="179123"/>
         </a:xfrm>
         <a:custGeom>
@@ -2046,7 +2349,7 @@
       </dsp:nvSpPr>
       <dsp:spPr>
         <a:xfrm>
-          <a:off x="3002280" y="428414"/>
+          <a:off x="2895658" y="428414"/>
           <a:ext cx="91440" cy="179123"/>
         </a:xfrm>
         <a:custGeom>
@@ -2101,7 +2404,7 @@
       </dsp:nvSpPr>
       <dsp:spPr>
         <a:xfrm>
-          <a:off x="1674716" y="1034023"/>
+          <a:off x="1568094" y="1034023"/>
           <a:ext cx="127945" cy="2814804"/>
         </a:xfrm>
         <a:custGeom>
@@ -2159,7 +2462,7 @@
       </dsp:nvSpPr>
       <dsp:spPr>
         <a:xfrm>
-          <a:off x="1674716" y="1034023"/>
+          <a:off x="1568094" y="1034023"/>
           <a:ext cx="127945" cy="2209195"/>
         </a:xfrm>
         <a:custGeom>
@@ -2217,7 +2520,7 @@
       </dsp:nvSpPr>
       <dsp:spPr>
         <a:xfrm>
-          <a:off x="1674716" y="1034023"/>
+          <a:off x="1568094" y="1034023"/>
           <a:ext cx="127945" cy="1603585"/>
         </a:xfrm>
         <a:custGeom>
@@ -2275,7 +2578,7 @@
       </dsp:nvSpPr>
       <dsp:spPr>
         <a:xfrm>
-          <a:off x="1674716" y="1034023"/>
+          <a:off x="1568094" y="1034023"/>
           <a:ext cx="127945" cy="997976"/>
         </a:xfrm>
         <a:custGeom>
@@ -2333,7 +2636,7 @@
       </dsp:nvSpPr>
       <dsp:spPr>
         <a:xfrm>
-          <a:off x="1674716" y="1034023"/>
+          <a:off x="1568094" y="1034023"/>
           <a:ext cx="127945" cy="392366"/>
         </a:xfrm>
         <a:custGeom>
@@ -2391,7 +2694,7 @@
       </dsp:nvSpPr>
       <dsp:spPr>
         <a:xfrm>
-          <a:off x="2015904" y="428414"/>
+          <a:off x="1909283" y="428414"/>
           <a:ext cx="1032095" cy="179123"/>
         </a:xfrm>
         <a:custGeom>
@@ -2452,7 +2755,7 @@
       </dsp:nvSpPr>
       <dsp:spPr>
         <a:xfrm>
-          <a:off x="2621514" y="1928"/>
+          <a:off x="2514893" y="1928"/>
           <a:ext cx="852971" cy="426485"/>
         </a:xfrm>
         <a:prstGeom prst="rect">
@@ -2524,7 +2827,7 @@
         </a:p>
       </dsp:txBody>
       <dsp:txXfrm>
-        <a:off x="2621514" y="1928"/>
+        <a:off x="2514893" y="1928"/>
         <a:ext cx="852971" cy="426485"/>
       </dsp:txXfrm>
     </dsp:sp>
@@ -2535,7 +2838,7 @@
       </dsp:nvSpPr>
       <dsp:spPr>
         <a:xfrm>
-          <a:off x="1589419" y="607538"/>
+          <a:off x="1482797" y="607538"/>
           <a:ext cx="852971" cy="426485"/>
         </a:xfrm>
         <a:prstGeom prst="rect">
@@ -2607,7 +2910,7 @@
         </a:p>
       </dsp:txBody>
       <dsp:txXfrm>
-        <a:off x="1589419" y="607538"/>
+        <a:off x="1482797" y="607538"/>
         <a:ext cx="852971" cy="426485"/>
       </dsp:txXfrm>
     </dsp:sp>
@@ -2618,7 +2921,90 @@
       </dsp:nvSpPr>
       <dsp:spPr>
         <a:xfrm>
-          <a:off x="1802662" y="1213147"/>
+          <a:off x="1696040" y="1213147"/>
+          <a:ext cx="852971" cy="426485"/>
+        </a:xfrm>
+        <a:prstGeom prst="rect">
+          <a:avLst/>
+        </a:prstGeom>
+        <a:solidFill>
+          <a:schemeClr val="accent1">
+            <a:hueOff val="0"/>
+            <a:satOff val="0"/>
+            <a:lumOff val="0"/>
+            <a:alphaOff val="0"/>
+          </a:schemeClr>
+        </a:solidFill>
+        <a:ln w="25400" cap="flat" cmpd="sng" algn="ctr">
+          <a:solidFill>
+            <a:schemeClr val="lt1">
+              <a:hueOff val="0"/>
+              <a:satOff val="0"/>
+              <a:lumOff val="0"/>
+              <a:alphaOff val="0"/>
+            </a:schemeClr>
+          </a:solidFill>
+          <a:prstDash val="solid"/>
+        </a:ln>
+        <a:effectLst/>
+      </dsp:spPr>
+      <dsp:style>
+        <a:lnRef idx="2">
+          <a:scrgbClr r="0" g="0" b="0"/>
+        </a:lnRef>
+        <a:fillRef idx="1">
+          <a:scrgbClr r="0" g="0" b="0"/>
+        </a:fillRef>
+        <a:effectRef idx="0">
+          <a:scrgbClr r="0" g="0" b="0"/>
+        </a:effectRef>
+        <a:fontRef idx="minor">
+          <a:schemeClr val="lt1"/>
+        </a:fontRef>
+      </dsp:style>
+      <dsp:txBody>
+        <a:bodyPr spcFirstLastPara="0" vert="horz" wrap="square" lIns="7620" tIns="7620" rIns="7620" bIns="7620" numCol="1" spcCol="1270" anchor="ctr" anchorCtr="0">
+          <a:noAutofit/>
+        </a:bodyPr>
+        <a:lstStyle/>
+        <a:p>
+          <a:pPr lvl="0" algn="ctr" defTabSz="533400">
+            <a:lnSpc>
+              <a:spcPct val="90000"/>
+            </a:lnSpc>
+            <a:spcBef>
+              <a:spcPct val="0"/>
+            </a:spcBef>
+            <a:spcAft>
+              <a:spcPct val="35000"/>
+            </a:spcAft>
+          </a:pPr>
+          <a:r>
+            <a:rPr lang="de-CH" sz="1200" kern="1200" dirty="0" smtClean="0">
+              <a:latin typeface="Times New Roman" pitchFamily="18" charset="0"/>
+              <a:cs typeface="Times New Roman" pitchFamily="18" charset="0"/>
+            </a:rPr>
+            <a:t>Operating Power</a:t>
+          </a:r>
+          <a:endParaRPr lang="de-CH" sz="1200" kern="1200" dirty="0">
+            <a:latin typeface="Times New Roman" pitchFamily="18" charset="0"/>
+            <a:cs typeface="Times New Roman" pitchFamily="18" charset="0"/>
+          </a:endParaRPr>
+        </a:p>
+      </dsp:txBody>
+      <dsp:txXfrm>
+        <a:off x="1696040" y="1213147"/>
+        <a:ext cx="852971" cy="426485"/>
+      </dsp:txXfrm>
+    </dsp:sp>
+    <dsp:sp modelId="{AAB359D6-13C1-48A5-A031-AA67724DC8CC}">
+      <dsp:nvSpPr>
+        <dsp:cNvPr id="0" name=""/>
+        <dsp:cNvSpPr/>
+      </dsp:nvSpPr>
+      <dsp:spPr>
+        <a:xfrm>
+          <a:off x="1696040" y="1818757"/>
           <a:ext cx="852971" cy="426485"/>
         </a:xfrm>
         <a:prstGeom prst="rect">
@@ -2681,14 +3067,7 @@
               <a:latin typeface="Times New Roman" pitchFamily="18" charset="0"/>
               <a:cs typeface="Times New Roman" pitchFamily="18" charset="0"/>
             </a:rPr>
-            <a:t>operating</a:t>
-          </a:r>
-          <a:r>
-            <a:rPr lang="de-CH" sz="1200" kern="1200" dirty="0" smtClean="0">
-              <a:latin typeface="Times New Roman" pitchFamily="18" charset="0"/>
-              <a:cs typeface="Times New Roman" pitchFamily="18" charset="0"/>
-            </a:rPr>
-            <a:t> power</a:t>
+            <a:t>Positioning</a:t>
           </a:r>
           <a:endParaRPr lang="de-CH" sz="1200" kern="1200" dirty="0">
             <a:latin typeface="Times New Roman" pitchFamily="18" charset="0"/>
@@ -2697,18 +3076,18 @@
         </a:p>
       </dsp:txBody>
       <dsp:txXfrm>
-        <a:off x="1802662" y="1213147"/>
+        <a:off x="1696040" y="1818757"/>
         <a:ext cx="852971" cy="426485"/>
       </dsp:txXfrm>
     </dsp:sp>
-    <dsp:sp modelId="{AAB359D6-13C1-48A5-A031-AA67724DC8CC}">
+    <dsp:sp modelId="{82DEAFC4-7013-4C49-90FF-005BCBA96AF7}">
       <dsp:nvSpPr>
         <dsp:cNvPr id="0" name=""/>
         <dsp:cNvSpPr/>
       </dsp:nvSpPr>
       <dsp:spPr>
         <a:xfrm>
-          <a:off x="1802662" y="1818757"/>
+          <a:off x="1696040" y="2424366"/>
           <a:ext cx="852971" cy="426485"/>
         </a:xfrm>
         <a:prstGeom prst="rect">
@@ -2771,7 +3150,14 @@
               <a:latin typeface="Times New Roman" pitchFamily="18" charset="0"/>
               <a:cs typeface="Times New Roman" pitchFamily="18" charset="0"/>
             </a:rPr>
-            <a:t>positioning</a:t>
+            <a:t>Velocity</a:t>
+          </a:r>
+          <a:r>
+            <a:rPr lang="de-CH" sz="1200" kern="1200" dirty="0" smtClean="0">
+              <a:latin typeface="Times New Roman" pitchFamily="18" charset="0"/>
+              <a:cs typeface="Times New Roman" pitchFamily="18" charset="0"/>
+            </a:rPr>
+            <a:t> Measurement</a:t>
           </a:r>
           <a:endParaRPr lang="de-CH" sz="1200" kern="1200" dirty="0">
             <a:latin typeface="Times New Roman" pitchFamily="18" charset="0"/>
@@ -2780,18 +3166,18 @@
         </a:p>
       </dsp:txBody>
       <dsp:txXfrm>
-        <a:off x="1802662" y="1818757"/>
+        <a:off x="1696040" y="2424366"/>
         <a:ext cx="852971" cy="426485"/>
       </dsp:txXfrm>
     </dsp:sp>
-    <dsp:sp modelId="{82DEAFC4-7013-4C49-90FF-005BCBA96AF7}">
+    <dsp:sp modelId="{FFFACED5-1680-4175-8D67-D039E2442676}">
       <dsp:nvSpPr>
         <dsp:cNvPr id="0" name=""/>
         <dsp:cNvSpPr/>
       </dsp:nvSpPr>
       <dsp:spPr>
         <a:xfrm>
-          <a:off x="1802662" y="2424366"/>
+          <a:off x="1696040" y="3029976"/>
           <a:ext cx="852971" cy="426485"/>
         </a:xfrm>
         <a:prstGeom prst="rect">
@@ -2850,25 +3236,11 @@
             </a:spcAft>
           </a:pPr>
           <a:r>
-            <a:rPr lang="de-CH" sz="1200" kern="1200" dirty="0" err="1" smtClean="0">
-              <a:latin typeface="Times New Roman" pitchFamily="18" charset="0"/>
-              <a:cs typeface="Times New Roman" pitchFamily="18" charset="0"/>
-            </a:rPr>
-            <a:t>velocity</a:t>
-          </a:r>
-          <a:r>
             <a:rPr lang="de-CH" sz="1200" kern="1200" dirty="0" smtClean="0">
               <a:latin typeface="Times New Roman" pitchFamily="18" charset="0"/>
               <a:cs typeface="Times New Roman" pitchFamily="18" charset="0"/>
             </a:rPr>
-            <a:t> </a:t>
-          </a:r>
-          <a:r>
-            <a:rPr lang="de-CH" sz="1200" kern="1200" dirty="0" err="1" smtClean="0">
-              <a:latin typeface="Times New Roman" pitchFamily="18" charset="0"/>
-              <a:cs typeface="Times New Roman" pitchFamily="18" charset="0"/>
-            </a:rPr>
-            <a:t>measurement</a:t>
+            <a:t>Storage</a:t>
           </a:r>
           <a:endParaRPr lang="de-CH" sz="1200" kern="1200" dirty="0">
             <a:latin typeface="Times New Roman" pitchFamily="18" charset="0"/>
@@ -2877,18 +3249,18 @@
         </a:p>
       </dsp:txBody>
       <dsp:txXfrm>
-        <a:off x="1802662" y="2424366"/>
+        <a:off x="1696040" y="3029976"/>
         <a:ext cx="852971" cy="426485"/>
       </dsp:txXfrm>
     </dsp:sp>
-    <dsp:sp modelId="{FFFACED5-1680-4175-8D67-D039E2442676}">
+    <dsp:sp modelId="{FF91C15D-2083-4341-B308-CCDF3E932AC6}">
       <dsp:nvSpPr>
         <dsp:cNvPr id="0" name=""/>
         <dsp:cNvSpPr/>
       </dsp:nvSpPr>
       <dsp:spPr>
         <a:xfrm>
-          <a:off x="1802662" y="3029976"/>
+          <a:off x="1696040" y="3635585"/>
           <a:ext cx="852971" cy="426485"/>
         </a:xfrm>
         <a:prstGeom prst="rect">
@@ -2947,11 +3319,11 @@
             </a:spcAft>
           </a:pPr>
           <a:r>
-            <a:rPr lang="de-CH" sz="1200" kern="1200" dirty="0" err="1" smtClean="0">
+            <a:rPr lang="de-CH" sz="1200" kern="1200" dirty="0" smtClean="0">
               <a:latin typeface="Times New Roman" pitchFamily="18" charset="0"/>
               <a:cs typeface="Times New Roman" pitchFamily="18" charset="0"/>
             </a:rPr>
-            <a:t>storage</a:t>
+            <a:t>Transport</a:t>
           </a:r>
           <a:endParaRPr lang="de-CH" sz="1200" kern="1200" dirty="0">
             <a:latin typeface="Times New Roman" pitchFamily="18" charset="0"/>
@@ -2960,90 +3332,7 @@
         </a:p>
       </dsp:txBody>
       <dsp:txXfrm>
-        <a:off x="1802662" y="3029976"/>
-        <a:ext cx="852971" cy="426485"/>
-      </dsp:txXfrm>
-    </dsp:sp>
-    <dsp:sp modelId="{FF91C15D-2083-4341-B308-CCDF3E932AC6}">
-      <dsp:nvSpPr>
-        <dsp:cNvPr id="0" name=""/>
-        <dsp:cNvSpPr/>
-      </dsp:nvSpPr>
-      <dsp:spPr>
-        <a:xfrm>
-          <a:off x="1802662" y="3635585"/>
-          <a:ext cx="852971" cy="426485"/>
-        </a:xfrm>
-        <a:prstGeom prst="rect">
-          <a:avLst/>
-        </a:prstGeom>
-        <a:solidFill>
-          <a:schemeClr val="accent1">
-            <a:hueOff val="0"/>
-            <a:satOff val="0"/>
-            <a:lumOff val="0"/>
-            <a:alphaOff val="0"/>
-          </a:schemeClr>
-        </a:solidFill>
-        <a:ln w="25400" cap="flat" cmpd="sng" algn="ctr">
-          <a:solidFill>
-            <a:schemeClr val="lt1">
-              <a:hueOff val="0"/>
-              <a:satOff val="0"/>
-              <a:lumOff val="0"/>
-              <a:alphaOff val="0"/>
-            </a:schemeClr>
-          </a:solidFill>
-          <a:prstDash val="solid"/>
-        </a:ln>
-        <a:effectLst/>
-      </dsp:spPr>
-      <dsp:style>
-        <a:lnRef idx="2">
-          <a:scrgbClr r="0" g="0" b="0"/>
-        </a:lnRef>
-        <a:fillRef idx="1">
-          <a:scrgbClr r="0" g="0" b="0"/>
-        </a:fillRef>
-        <a:effectRef idx="0">
-          <a:scrgbClr r="0" g="0" b="0"/>
-        </a:effectRef>
-        <a:fontRef idx="minor">
-          <a:schemeClr val="lt1"/>
-        </a:fontRef>
-      </dsp:style>
-      <dsp:txBody>
-        <a:bodyPr spcFirstLastPara="0" vert="horz" wrap="square" lIns="7620" tIns="7620" rIns="7620" bIns="7620" numCol="1" spcCol="1270" anchor="ctr" anchorCtr="0">
-          <a:noAutofit/>
-        </a:bodyPr>
-        <a:lstStyle/>
-        <a:p>
-          <a:pPr lvl="0" algn="ctr" defTabSz="533400">
-            <a:lnSpc>
-              <a:spcPct val="90000"/>
-            </a:lnSpc>
-            <a:spcBef>
-              <a:spcPct val="0"/>
-            </a:spcBef>
-            <a:spcAft>
-              <a:spcPct val="35000"/>
-            </a:spcAft>
-          </a:pPr>
-          <a:r>
-            <a:rPr lang="de-CH" sz="1200" kern="1200" smtClean="0">
-              <a:latin typeface="Times New Roman" pitchFamily="18" charset="0"/>
-              <a:cs typeface="Times New Roman" pitchFamily="18" charset="0"/>
-            </a:rPr>
-            <a:t>transport</a:t>
-          </a:r>
-          <a:endParaRPr lang="de-CH" sz="1200" kern="1200">
-            <a:latin typeface="Times New Roman" pitchFamily="18" charset="0"/>
-            <a:cs typeface="Times New Roman" pitchFamily="18" charset="0"/>
-          </a:endParaRPr>
-        </a:p>
-      </dsp:txBody>
-      <dsp:txXfrm>
-        <a:off x="1802662" y="3635585"/>
+        <a:off x="1696040" y="3635585"/>
         <a:ext cx="852971" cy="426485"/>
       </dsp:txXfrm>
     </dsp:sp>
@@ -3054,7 +3343,7 @@
       </dsp:nvSpPr>
       <dsp:spPr>
         <a:xfrm>
-          <a:off x="2621514" y="607538"/>
+          <a:off x="2514893" y="607538"/>
           <a:ext cx="852971" cy="426485"/>
         </a:xfrm>
         <a:prstGeom prst="rect">
@@ -3120,11 +3409,11 @@
             <a:t>Scanner </a:t>
           </a:r>
           <a:r>
-            <a:rPr lang="de-CH" sz="1200" kern="1200" dirty="0" err="1" smtClean="0">
+            <a:rPr lang="de-CH" sz="1200" kern="1200" dirty="0" smtClean="0">
               <a:latin typeface="Times New Roman" pitchFamily="18" charset="0"/>
               <a:cs typeface="Times New Roman" pitchFamily="18" charset="0"/>
             </a:rPr>
-            <a:t>module</a:t>
+            <a:t>Module</a:t>
           </a:r>
           <a:endParaRPr lang="de-CH" sz="1200" kern="1200" dirty="0">
             <a:latin typeface="Times New Roman" pitchFamily="18" charset="0"/>
@@ -3133,7 +3422,7 @@
         </a:p>
       </dsp:txBody>
       <dsp:txXfrm>
-        <a:off x="2621514" y="607538"/>
+        <a:off x="2514893" y="607538"/>
         <a:ext cx="852971" cy="426485"/>
       </dsp:txXfrm>
     </dsp:sp>
@@ -3144,7 +3433,7 @@
       </dsp:nvSpPr>
       <dsp:spPr>
         <a:xfrm>
-          <a:off x="3653609" y="607538"/>
+          <a:off x="3546988" y="607538"/>
           <a:ext cx="852971" cy="426485"/>
         </a:xfrm>
         <a:prstGeom prst="rect">
@@ -3216,7 +3505,180 @@
         </a:p>
       </dsp:txBody>
       <dsp:txXfrm>
-        <a:off x="3653609" y="607538"/>
+        <a:off x="3546988" y="607538"/>
+        <a:ext cx="852971" cy="426485"/>
+      </dsp:txXfrm>
+    </dsp:sp>
+    <dsp:sp modelId="{B6DBE3EE-A757-473A-A921-D12B9091962B}">
+      <dsp:nvSpPr>
+        <dsp:cNvPr id="0" name=""/>
+        <dsp:cNvSpPr/>
+      </dsp:nvSpPr>
+      <dsp:spPr>
+        <a:xfrm>
+          <a:off x="3760230" y="1213147"/>
+          <a:ext cx="852971" cy="426485"/>
+        </a:xfrm>
+        <a:prstGeom prst="rect">
+          <a:avLst/>
+        </a:prstGeom>
+        <a:solidFill>
+          <a:schemeClr val="accent1">
+            <a:hueOff val="0"/>
+            <a:satOff val="0"/>
+            <a:lumOff val="0"/>
+            <a:alphaOff val="0"/>
+          </a:schemeClr>
+        </a:solidFill>
+        <a:ln w="25400" cap="flat" cmpd="sng" algn="ctr">
+          <a:solidFill>
+            <a:schemeClr val="lt1">
+              <a:hueOff val="0"/>
+              <a:satOff val="0"/>
+              <a:lumOff val="0"/>
+              <a:alphaOff val="0"/>
+            </a:schemeClr>
+          </a:solidFill>
+          <a:prstDash val="solid"/>
+        </a:ln>
+        <a:effectLst/>
+      </dsp:spPr>
+      <dsp:style>
+        <a:lnRef idx="2">
+          <a:scrgbClr r="0" g="0" b="0"/>
+        </a:lnRef>
+        <a:fillRef idx="1">
+          <a:scrgbClr r="0" g="0" b="0"/>
+        </a:fillRef>
+        <a:effectRef idx="0">
+          <a:scrgbClr r="0" g="0" b="0"/>
+        </a:effectRef>
+        <a:fontRef idx="minor">
+          <a:schemeClr val="lt1"/>
+        </a:fontRef>
+      </dsp:style>
+      <dsp:txBody>
+        <a:bodyPr spcFirstLastPara="0" vert="horz" wrap="square" lIns="7620" tIns="7620" rIns="7620" bIns="7620" numCol="1" spcCol="1270" anchor="ctr" anchorCtr="0">
+          <a:noAutofit/>
+        </a:bodyPr>
+        <a:lstStyle/>
+        <a:p>
+          <a:pPr lvl="0" algn="ctr" defTabSz="533400">
+            <a:lnSpc>
+              <a:spcPct val="90000"/>
+            </a:lnSpc>
+            <a:spcBef>
+              <a:spcPct val="0"/>
+            </a:spcBef>
+            <a:spcAft>
+              <a:spcPct val="35000"/>
+            </a:spcAft>
+          </a:pPr>
+          <a:r>
+            <a:rPr lang="de-CH" sz="1200" kern="1200" dirty="0" smtClean="0">
+              <a:latin typeface="Times New Roman" pitchFamily="18" charset="0"/>
+              <a:cs typeface="Times New Roman" pitchFamily="18" charset="0"/>
+            </a:rPr>
+            <a:t>Image Hole </a:t>
+          </a:r>
+          <a:r>
+            <a:rPr lang="de-CH" sz="1200" kern="1200" dirty="0" err="1" smtClean="0">
+              <a:latin typeface="Times New Roman" pitchFamily="18" charset="0"/>
+              <a:cs typeface="Times New Roman" pitchFamily="18" charset="0"/>
+            </a:rPr>
+            <a:t>Detection</a:t>
+          </a:r>
+          <a:endParaRPr lang="de-CH" sz="1200" kern="1200" dirty="0">
+            <a:latin typeface="Times New Roman" pitchFamily="18" charset="0"/>
+            <a:cs typeface="Times New Roman" pitchFamily="18" charset="0"/>
+          </a:endParaRPr>
+        </a:p>
+      </dsp:txBody>
+      <dsp:txXfrm>
+        <a:off x="3760230" y="1213147"/>
+        <a:ext cx="852971" cy="426485"/>
+      </dsp:txXfrm>
+    </dsp:sp>
+    <dsp:sp modelId="{10D03729-DDCA-44E2-BFF2-87534A7CB523}">
+      <dsp:nvSpPr>
+        <dsp:cNvPr id="0" name=""/>
+        <dsp:cNvSpPr/>
+      </dsp:nvSpPr>
+      <dsp:spPr>
+        <a:xfrm>
+          <a:off x="3760230" y="1818757"/>
+          <a:ext cx="852971" cy="426485"/>
+        </a:xfrm>
+        <a:prstGeom prst="rect">
+          <a:avLst/>
+        </a:prstGeom>
+        <a:solidFill>
+          <a:schemeClr val="accent1">
+            <a:hueOff val="0"/>
+            <a:satOff val="0"/>
+            <a:lumOff val="0"/>
+            <a:alphaOff val="0"/>
+          </a:schemeClr>
+        </a:solidFill>
+        <a:ln w="25400" cap="flat" cmpd="sng" algn="ctr">
+          <a:solidFill>
+            <a:schemeClr val="lt1">
+              <a:hueOff val="0"/>
+              <a:satOff val="0"/>
+              <a:lumOff val="0"/>
+              <a:alphaOff val="0"/>
+            </a:schemeClr>
+          </a:solidFill>
+          <a:prstDash val="solid"/>
+        </a:ln>
+        <a:effectLst/>
+      </dsp:spPr>
+      <dsp:style>
+        <a:lnRef idx="2">
+          <a:scrgbClr r="0" g="0" b="0"/>
+        </a:lnRef>
+        <a:fillRef idx="1">
+          <a:scrgbClr r="0" g="0" b="0"/>
+        </a:fillRef>
+        <a:effectRef idx="0">
+          <a:scrgbClr r="0" g="0" b="0"/>
+        </a:effectRef>
+        <a:fontRef idx="minor">
+          <a:schemeClr val="lt1"/>
+        </a:fontRef>
+      </dsp:style>
+      <dsp:txBody>
+        <a:bodyPr spcFirstLastPara="0" vert="horz" wrap="square" lIns="7620" tIns="7620" rIns="7620" bIns="7620" numCol="1" spcCol="1270" anchor="ctr" anchorCtr="0">
+          <a:noAutofit/>
+        </a:bodyPr>
+        <a:lstStyle/>
+        <a:p>
+          <a:pPr lvl="0" algn="ctr" defTabSz="533400">
+            <a:lnSpc>
+              <a:spcPct val="90000"/>
+            </a:lnSpc>
+            <a:spcBef>
+              <a:spcPct val="0"/>
+            </a:spcBef>
+            <a:spcAft>
+              <a:spcPct val="35000"/>
+            </a:spcAft>
+          </a:pPr>
+          <a:r>
+            <a:rPr lang="de-CH" sz="1200" kern="1200" dirty="0" smtClean="0">
+              <a:latin typeface="Times New Roman" pitchFamily="18" charset="0"/>
+              <a:cs typeface="Times New Roman" pitchFamily="18" charset="0"/>
+            </a:rPr>
+            <a:t>Digital Output</a:t>
+          </a:r>
+          <a:endParaRPr lang="de-CH" sz="1200" kern="1200" dirty="0">
+            <a:latin typeface="Times New Roman" pitchFamily="18" charset="0"/>
+            <a:cs typeface="Times New Roman" pitchFamily="18" charset="0"/>
+          </a:endParaRPr>
+        </a:p>
+      </dsp:txBody>
+      <dsp:txXfrm>
+        <a:off x="3760230" y="1818757"/>
         <a:ext cx="852971" cy="426485"/>
       </dsp:txXfrm>
     </dsp:sp>
@@ -8399,13 +8861,13 @@
           <p:nvPr>
             <p:extLst>
               <p:ext uri="{D42A27DB-BD31-4B8C-83A1-F6EECF244321}">
-                <p14:modId xmlns:p14="http://schemas.microsoft.com/office/powerpoint/2010/main" val="1389390096"/>
+                <p14:modId xmlns:p14="http://schemas.microsoft.com/office/powerpoint/2010/main" val="3831070085"/>
               </p:ext>
             </p:extLst>
           </p:nvPr>
         </p:nvGraphicFramePr>
         <p:xfrm>
-          <a:off x="1524000" y="1397000"/>
+          <a:off x="1475656" y="692696"/>
           <a:ext cx="6096000" cy="4064000"/>
         </p:xfrm>
         <a:graphic>

</xml_diff>